<commit_message>
Add: add new paper
</commit_message>
<xml_diff>
--- a/raft/Understanding of Raft.pptx
+++ b/raft/Understanding of Raft.pptx
@@ -6,6 +6,7 @@
   </p:sldMasterIdLst>
   <p:sldIdLst>
     <p:sldId id="256" r:id="rId2"/>
+    <p:sldId id="257" r:id="rId3"/>
   </p:sldIdLst>
   <p:sldSz cx="12192000" cy="6858000"/>
   <p:notesSz cx="6858000" cy="9144000"/>
@@ -104,6 +105,11 @@
       </a:defRPr>
     </a:lvl9pPr>
   </p:defaultTextStyle>
+  <p:extLst>
+    <p:ext uri="{EFAFB233-063F-42B5-8137-9DF3F51BA10A}">
+      <p15:sldGuideLst xmlns:p15="http://schemas.microsoft.com/office/powerpoint/2012/main"/>
+    </p:ext>
+  </p:extLst>
 </p:presentation>
 </file>
 
@@ -3111,10 +3117,351 @@
           <a:chExt cx="0" cy="0"/>
         </a:xfrm>
       </p:grpSpPr>
+      <p:sp>
+        <p:nvSpPr>
+          <p:cNvPr id="3" name="文本框 2">
+            <a:extLst>
+              <a:ext uri="{FF2B5EF4-FFF2-40B4-BE49-F238E27FC236}">
+                <a16:creationId xmlns:a16="http://schemas.microsoft.com/office/drawing/2014/main" id="{67AD87FE-4628-E049-B0DB-EA9A3E4B6589}"/>
+              </a:ext>
+            </a:extLst>
+          </p:cNvPr>
+          <p:cNvSpPr txBox="1"/>
+          <p:nvPr/>
+        </p:nvSpPr>
+        <p:spPr>
+          <a:xfrm>
+            <a:off x="5142018" y="1104406"/>
+            <a:ext cx="1888176" cy="1200329"/>
+          </a:xfrm>
+          <a:prstGeom prst="rect">
+            <a:avLst/>
+          </a:prstGeom>
+          <a:noFill/>
+        </p:spPr>
+        <p:txBody>
+          <a:bodyPr wrap="square" rtlCol="0">
+            <a:spAutoFit/>
+          </a:bodyPr>
+          <a:lstStyle/>
+          <a:p>
+            <a:r>
+              <a:rPr kumimoji="1" lang="en-US" altLang="zh-CN" sz="7200" dirty="0"/>
+              <a:t>Raft</a:t>
+            </a:r>
+            <a:endParaRPr kumimoji="1" lang="zh-CN" altLang="en-US" sz="7200" dirty="0"/>
+          </a:p>
+        </p:txBody>
+      </p:sp>
+      <p:sp>
+        <p:nvSpPr>
+          <p:cNvPr id="4" name="文本框 3">
+            <a:extLst>
+              <a:ext uri="{FF2B5EF4-FFF2-40B4-BE49-F238E27FC236}">
+                <a16:creationId xmlns:a16="http://schemas.microsoft.com/office/drawing/2014/main" id="{94A64D7B-25B4-6047-88C6-CEE8A06CBBAA}"/>
+              </a:ext>
+            </a:extLst>
+          </p:cNvPr>
+          <p:cNvSpPr txBox="1"/>
+          <p:nvPr/>
+        </p:nvSpPr>
+        <p:spPr>
+          <a:xfrm>
+            <a:off x="3800106" y="2945081"/>
+            <a:ext cx="4572000" cy="646331"/>
+          </a:xfrm>
+          <a:prstGeom prst="rect">
+            <a:avLst/>
+          </a:prstGeom>
+          <a:noFill/>
+        </p:spPr>
+        <p:txBody>
+          <a:bodyPr wrap="square" rtlCol="0">
+            <a:spAutoFit/>
+          </a:bodyPr>
+          <a:lstStyle/>
+          <a:p>
+            <a:r>
+              <a:rPr lang="en" altLang="zh-CN" sz="3600" dirty="0"/>
+              <a:t>Consensus Algorithm</a:t>
+            </a:r>
+          </a:p>
+        </p:txBody>
+      </p:sp>
     </p:spTree>
     <p:extLst>
       <p:ext uri="{BB962C8B-B14F-4D97-AF65-F5344CB8AC3E}">
         <p14:creationId xmlns:p14="http://schemas.microsoft.com/office/powerpoint/2010/main" val="4288635109"/>
+      </p:ext>
+    </p:extLst>
+  </p:cSld>
+  <p:clrMapOvr>
+    <a:masterClrMapping/>
+  </p:clrMapOvr>
+</p:sld>
+</file>
+
+<file path=ppt/slides/slide2.xml><?xml version="1.0" encoding="utf-8"?>
+<p:sld xmlns:a="http://schemas.openxmlformats.org/drawingml/2006/main" xmlns:r="http://schemas.openxmlformats.org/officeDocument/2006/relationships" xmlns:p="http://schemas.openxmlformats.org/presentationml/2006/main">
+  <p:cSld>
+    <p:spTree>
+      <p:nvGrpSpPr>
+        <p:cNvPr id="1" name=""/>
+        <p:cNvGrpSpPr/>
+        <p:nvPr/>
+      </p:nvGrpSpPr>
+      <p:grpSpPr>
+        <a:xfrm>
+          <a:off x="0" y="0"/>
+          <a:ext cx="0" cy="0"/>
+          <a:chOff x="0" y="0"/>
+          <a:chExt cx="0" cy="0"/>
+        </a:xfrm>
+      </p:grpSpPr>
+      <p:sp>
+        <p:nvSpPr>
+          <p:cNvPr id="2" name="椭圆 1">
+            <a:extLst>
+              <a:ext uri="{FF2B5EF4-FFF2-40B4-BE49-F238E27FC236}">
+                <a16:creationId xmlns:a16="http://schemas.microsoft.com/office/drawing/2014/main" id="{EA73F259-3086-984D-9CDD-450228588E2F}"/>
+              </a:ext>
+            </a:extLst>
+          </p:cNvPr>
+          <p:cNvSpPr/>
+          <p:nvPr/>
+        </p:nvSpPr>
+        <p:spPr>
+          <a:xfrm>
+            <a:off x="3679369" y="2331519"/>
+            <a:ext cx="1068780" cy="1068779"/>
+          </a:xfrm>
+          <a:prstGeom prst="ellipse">
+            <a:avLst/>
+          </a:prstGeom>
+          <a:noFill/>
+          <a:ln w="25400"/>
+        </p:spPr>
+        <p:style>
+          <a:lnRef idx="2">
+            <a:schemeClr val="accent1">
+              <a:shade val="50000"/>
+            </a:schemeClr>
+          </a:lnRef>
+          <a:fillRef idx="1">
+            <a:schemeClr val="accent1"/>
+          </a:fillRef>
+          <a:effectRef idx="0">
+            <a:schemeClr val="accent1"/>
+          </a:effectRef>
+          <a:fontRef idx="minor">
+            <a:schemeClr val="lt1"/>
+          </a:fontRef>
+        </p:style>
+        <p:txBody>
+          <a:bodyPr rtlCol="0" anchor="ctr"/>
+          <a:lstStyle/>
+          <a:p>
+            <a:pPr algn="ctr"/>
+            <a:endParaRPr kumimoji="1" lang="zh-CN" altLang="en-US"/>
+          </a:p>
+        </p:txBody>
+      </p:sp>
+      <p:sp>
+        <p:nvSpPr>
+          <p:cNvPr id="5" name="椭圆 4">
+            <a:extLst>
+              <a:ext uri="{FF2B5EF4-FFF2-40B4-BE49-F238E27FC236}">
+                <a16:creationId xmlns:a16="http://schemas.microsoft.com/office/drawing/2014/main" id="{61BFF7E8-5011-DC4E-A4F9-D8A9823E415A}"/>
+              </a:ext>
+            </a:extLst>
+          </p:cNvPr>
+          <p:cNvSpPr/>
+          <p:nvPr/>
+        </p:nvSpPr>
+        <p:spPr>
+          <a:xfrm>
+            <a:off x="5816929" y="591786"/>
+            <a:ext cx="1068780" cy="1068779"/>
+          </a:xfrm>
+          <a:prstGeom prst="ellipse">
+            <a:avLst/>
+          </a:prstGeom>
+          <a:noFill/>
+          <a:ln w="25400"/>
+        </p:spPr>
+        <p:style>
+          <a:lnRef idx="2">
+            <a:schemeClr val="accent1">
+              <a:shade val="50000"/>
+            </a:schemeClr>
+          </a:lnRef>
+          <a:fillRef idx="1">
+            <a:schemeClr val="accent1"/>
+          </a:fillRef>
+          <a:effectRef idx="0">
+            <a:schemeClr val="accent1"/>
+          </a:effectRef>
+          <a:fontRef idx="minor">
+            <a:schemeClr val="lt1"/>
+          </a:fontRef>
+        </p:style>
+        <p:txBody>
+          <a:bodyPr rtlCol="0" anchor="ctr"/>
+          <a:lstStyle/>
+          <a:p>
+            <a:pPr algn="ctr"/>
+            <a:endParaRPr kumimoji="1" lang="zh-CN" altLang="en-US"/>
+          </a:p>
+        </p:txBody>
+      </p:sp>
+      <p:sp>
+        <p:nvSpPr>
+          <p:cNvPr id="6" name="椭圆 5">
+            <a:extLst>
+              <a:ext uri="{FF2B5EF4-FFF2-40B4-BE49-F238E27FC236}">
+                <a16:creationId xmlns:a16="http://schemas.microsoft.com/office/drawing/2014/main" id="{E7552D61-08F7-0041-A6D6-ABF355747847}"/>
+              </a:ext>
+            </a:extLst>
+          </p:cNvPr>
+          <p:cNvSpPr/>
+          <p:nvPr/>
+        </p:nvSpPr>
+        <p:spPr>
+          <a:xfrm>
+            <a:off x="7954489" y="2351312"/>
+            <a:ext cx="1068780" cy="1068779"/>
+          </a:xfrm>
+          <a:prstGeom prst="ellipse">
+            <a:avLst/>
+          </a:prstGeom>
+          <a:noFill/>
+          <a:ln w="25400"/>
+        </p:spPr>
+        <p:style>
+          <a:lnRef idx="2">
+            <a:schemeClr val="accent1">
+              <a:shade val="50000"/>
+            </a:schemeClr>
+          </a:lnRef>
+          <a:fillRef idx="1">
+            <a:schemeClr val="accent1"/>
+          </a:fillRef>
+          <a:effectRef idx="0">
+            <a:schemeClr val="accent1"/>
+          </a:effectRef>
+          <a:fontRef idx="minor">
+            <a:schemeClr val="lt1"/>
+          </a:fontRef>
+        </p:style>
+        <p:txBody>
+          <a:bodyPr rtlCol="0" anchor="ctr"/>
+          <a:lstStyle/>
+          <a:p>
+            <a:pPr algn="ctr"/>
+            <a:endParaRPr kumimoji="1" lang="zh-CN" altLang="en-US"/>
+          </a:p>
+        </p:txBody>
+      </p:sp>
+      <p:sp>
+        <p:nvSpPr>
+          <p:cNvPr id="7" name="椭圆 6">
+            <a:extLst>
+              <a:ext uri="{FF2B5EF4-FFF2-40B4-BE49-F238E27FC236}">
+                <a16:creationId xmlns:a16="http://schemas.microsoft.com/office/drawing/2014/main" id="{267E14A8-957E-4F45-A624-61982FD29EDE}"/>
+              </a:ext>
+            </a:extLst>
+          </p:cNvPr>
+          <p:cNvSpPr/>
+          <p:nvPr/>
+        </p:nvSpPr>
+        <p:spPr>
+          <a:xfrm>
+            <a:off x="4748149" y="4451265"/>
+            <a:ext cx="1068780" cy="1068779"/>
+          </a:xfrm>
+          <a:prstGeom prst="ellipse">
+            <a:avLst/>
+          </a:prstGeom>
+          <a:noFill/>
+          <a:ln w="25400"/>
+        </p:spPr>
+        <p:style>
+          <a:lnRef idx="2">
+            <a:schemeClr val="accent1">
+              <a:shade val="50000"/>
+            </a:schemeClr>
+          </a:lnRef>
+          <a:fillRef idx="1">
+            <a:schemeClr val="accent1"/>
+          </a:fillRef>
+          <a:effectRef idx="0">
+            <a:schemeClr val="accent1"/>
+          </a:effectRef>
+          <a:fontRef idx="minor">
+            <a:schemeClr val="lt1"/>
+          </a:fontRef>
+        </p:style>
+        <p:txBody>
+          <a:bodyPr rtlCol="0" anchor="ctr"/>
+          <a:lstStyle/>
+          <a:p>
+            <a:pPr algn="ctr"/>
+            <a:endParaRPr kumimoji="1" lang="zh-CN" altLang="en-US"/>
+          </a:p>
+        </p:txBody>
+      </p:sp>
+      <p:sp>
+        <p:nvSpPr>
+          <p:cNvPr id="8" name="椭圆 7">
+            <a:extLst>
+              <a:ext uri="{FF2B5EF4-FFF2-40B4-BE49-F238E27FC236}">
+                <a16:creationId xmlns:a16="http://schemas.microsoft.com/office/drawing/2014/main" id="{7B49ECE8-D16A-1344-AFF4-A3D0C1A104DF}"/>
+              </a:ext>
+            </a:extLst>
+          </p:cNvPr>
+          <p:cNvSpPr/>
+          <p:nvPr/>
+        </p:nvSpPr>
+        <p:spPr>
+          <a:xfrm>
+            <a:off x="6885709" y="4451266"/>
+            <a:ext cx="1068780" cy="1068779"/>
+          </a:xfrm>
+          <a:prstGeom prst="ellipse">
+            <a:avLst/>
+          </a:prstGeom>
+          <a:noFill/>
+          <a:ln w="25400"/>
+        </p:spPr>
+        <p:style>
+          <a:lnRef idx="2">
+            <a:schemeClr val="accent1">
+              <a:shade val="50000"/>
+            </a:schemeClr>
+          </a:lnRef>
+          <a:fillRef idx="1">
+            <a:schemeClr val="accent1"/>
+          </a:fillRef>
+          <a:effectRef idx="0">
+            <a:schemeClr val="accent1"/>
+          </a:effectRef>
+          <a:fontRef idx="minor">
+            <a:schemeClr val="lt1"/>
+          </a:fontRef>
+        </p:style>
+        <p:txBody>
+          <a:bodyPr rtlCol="0" anchor="ctr"/>
+          <a:lstStyle/>
+          <a:p>
+            <a:pPr algn="ctr"/>
+            <a:endParaRPr kumimoji="1" lang="zh-CN" altLang="en-US"/>
+          </a:p>
+        </p:txBody>
+      </p:sp>
+    </p:spTree>
+    <p:extLst>
+      <p:ext uri="{BB962C8B-B14F-4D97-AF65-F5344CB8AC3E}">
+        <p14:creationId xmlns:p14="http://schemas.microsoft.com/office/powerpoint/2010/main" val="1612694513"/>
       </p:ext>
     </p:extLst>
   </p:cSld>

</xml_diff>